<commit_message>
Incorporate the review comments
</commit_message>
<xml_diff>
--- a/exercise5/DevOpsPipeline.pptx
+++ b/exercise5/DevOpsPipeline.pptx
@@ -5959,7 +5959,7 @@
           </a:ln>
           <a:extLst>
             <a:ext uri="{C572A759-6A51-4108-AA02-DFA0A04FC94B}">
-              <ma14:wrappingTextBoxFlag xmlns:ma14="http://schemas.microsoft.com/office/mac/drawingml/2011/main" xmlns:a14="http://schemas.microsoft.com/office/drawing/2010/main" xmlns:m="http://schemas.openxmlformats.org/officeDocument/2006/math" xmlns="" val="1"/>
+              <ma14:wrappingTextBoxFlag xmlns="" xmlns:m="http://schemas.openxmlformats.org/officeDocument/2006/math" xmlns:a14="http://schemas.microsoft.com/office/drawing/2010/main" xmlns:ma14="http://schemas.microsoft.com/office/mac/drawingml/2011/main" val="1"/>
             </a:ext>
           </a:extLst>
         </p:spPr>
@@ -6101,7 +6101,7 @@
           </a:ln>
           <a:extLst>
             <a:ext uri="{C572A759-6A51-4108-AA02-DFA0A04FC94B}">
-              <ma14:wrappingTextBoxFlag xmlns:ma14="http://schemas.microsoft.com/office/mac/drawingml/2011/main" xmlns:a14="http://schemas.microsoft.com/office/drawing/2010/main" xmlns:m="http://schemas.openxmlformats.org/officeDocument/2006/math" xmlns="" val="1"/>
+              <ma14:wrappingTextBoxFlag xmlns="" xmlns:m="http://schemas.openxmlformats.org/officeDocument/2006/math" xmlns:a14="http://schemas.microsoft.com/office/drawing/2010/main" xmlns:ma14="http://schemas.microsoft.com/office/mac/drawingml/2011/main" val="1"/>
             </a:ext>
           </a:extLst>
         </p:spPr>
@@ -6157,7 +6157,7 @@
           </a:ln>
           <a:extLst>
             <a:ext uri="{C572A759-6A51-4108-AA02-DFA0A04FC94B}">
-              <ma14:wrappingTextBoxFlag xmlns:ma14="http://schemas.microsoft.com/office/mac/drawingml/2011/main" xmlns:a14="http://schemas.microsoft.com/office/drawing/2010/main" xmlns:m="http://schemas.openxmlformats.org/officeDocument/2006/math" xmlns="" val="1"/>
+              <ma14:wrappingTextBoxFlag xmlns="" xmlns:m="http://schemas.openxmlformats.org/officeDocument/2006/math" xmlns:a14="http://schemas.microsoft.com/office/drawing/2010/main" xmlns:ma14="http://schemas.microsoft.com/office/mac/drawingml/2011/main" val="1"/>
             </a:ext>
           </a:extLst>
         </p:spPr>
@@ -6213,7 +6213,7 @@
           </a:ln>
           <a:extLst>
             <a:ext uri="{C572A759-6A51-4108-AA02-DFA0A04FC94B}">
-              <ma14:wrappingTextBoxFlag xmlns:ma14="http://schemas.microsoft.com/office/mac/drawingml/2011/main" xmlns:a14="http://schemas.microsoft.com/office/drawing/2010/main" xmlns:m="http://schemas.openxmlformats.org/officeDocument/2006/math" xmlns="" val="1"/>
+              <ma14:wrappingTextBoxFlag xmlns="" xmlns:m="http://schemas.openxmlformats.org/officeDocument/2006/math" xmlns:a14="http://schemas.microsoft.com/office/drawing/2010/main" xmlns:ma14="http://schemas.microsoft.com/office/mac/drawingml/2011/main" val="1"/>
             </a:ext>
           </a:extLst>
         </p:spPr>
@@ -6269,7 +6269,7 @@
           </a:ln>
           <a:extLst>
             <a:ext uri="{C572A759-6A51-4108-AA02-DFA0A04FC94B}">
-              <ma14:wrappingTextBoxFlag xmlns:ma14="http://schemas.microsoft.com/office/mac/drawingml/2011/main" xmlns:a14="http://schemas.microsoft.com/office/drawing/2010/main" xmlns:m="http://schemas.openxmlformats.org/officeDocument/2006/math" xmlns="" val="1"/>
+              <ma14:wrappingTextBoxFlag xmlns="" xmlns:m="http://schemas.openxmlformats.org/officeDocument/2006/math" xmlns:a14="http://schemas.microsoft.com/office/drawing/2010/main" xmlns:ma14="http://schemas.microsoft.com/office/mac/drawingml/2011/main" val="1"/>
             </a:ext>
           </a:extLst>
         </p:spPr>
@@ -6337,7 +6337,7 @@
           </a:ln>
           <a:extLst>
             <a:ext uri="{C572A759-6A51-4108-AA02-DFA0A04FC94B}">
-              <ma14:wrappingTextBoxFlag xmlns:ma14="http://schemas.microsoft.com/office/mac/drawingml/2011/main" xmlns:a14="http://schemas.microsoft.com/office/drawing/2010/main" xmlns:m="http://schemas.openxmlformats.org/officeDocument/2006/math" xmlns="" val="1"/>
+              <ma14:wrappingTextBoxFlag xmlns="" xmlns:m="http://schemas.openxmlformats.org/officeDocument/2006/math" xmlns:a14="http://schemas.microsoft.com/office/drawing/2010/main" xmlns:ma14="http://schemas.microsoft.com/office/mac/drawingml/2011/main" val="1"/>
             </a:ext>
           </a:extLst>
         </p:spPr>
@@ -6394,7 +6394,7 @@
           </a:ln>
           <a:extLst>
             <a:ext uri="{C572A759-6A51-4108-AA02-DFA0A04FC94B}">
-              <ma14:wrappingTextBoxFlag xmlns:ma14="http://schemas.microsoft.com/office/mac/drawingml/2011/main" xmlns:a14="http://schemas.microsoft.com/office/drawing/2010/main" xmlns:m="http://schemas.openxmlformats.org/officeDocument/2006/math" xmlns="" val="1"/>
+              <ma14:wrappingTextBoxFlag xmlns="" xmlns:m="http://schemas.openxmlformats.org/officeDocument/2006/math" xmlns:a14="http://schemas.microsoft.com/office/drawing/2010/main" xmlns:ma14="http://schemas.microsoft.com/office/mac/drawingml/2011/main" val="1"/>
             </a:ext>
           </a:extLst>
         </p:spPr>
@@ -6714,6 +6714,282 @@
               <a:t>Build application container or OS image</a:t>
             </a:r>
             <a:endParaRPr sz="1000" dirty="0"/>
+          </a:p>
+        </p:txBody>
+      </p:sp>
+      <p:sp>
+        <p:nvSpPr>
+          <p:cNvPr id="3" name="TextBox 2">
+            <a:extLst>
+              <a:ext uri="{FF2B5EF4-FFF2-40B4-BE49-F238E27FC236}">
+                <a16:creationId xmlns:a16="http://schemas.microsoft.com/office/drawing/2014/main" id="{F590867C-7EEA-9C4C-943C-BBD3FA31F023}"/>
+              </a:ext>
+            </a:extLst>
+          </p:cNvPr>
+          <p:cNvSpPr txBox="1"/>
+          <p:nvPr/>
+        </p:nvSpPr>
+        <p:spPr>
+          <a:xfrm>
+            <a:off x="3587858" y="3330522"/>
+            <a:ext cx="732893" cy="400110"/>
+          </a:xfrm>
+          <a:prstGeom prst="rect">
+            <a:avLst/>
+          </a:prstGeom>
+        </p:spPr>
+        <p:style>
+          <a:lnRef idx="2">
+            <a:schemeClr val="accent1">
+              <a:shade val="50000"/>
+            </a:schemeClr>
+          </a:lnRef>
+          <a:fillRef idx="1">
+            <a:schemeClr val="accent1"/>
+          </a:fillRef>
+          <a:effectRef idx="0">
+            <a:schemeClr val="accent1"/>
+          </a:effectRef>
+          <a:fontRef idx="minor">
+            <a:schemeClr val="lt1"/>
+          </a:fontRef>
+        </p:style>
+        <p:txBody>
+          <a:bodyPr wrap="none" rtlCol="0">
+            <a:spAutoFit/>
+          </a:bodyPr>
+          <a:lstStyle/>
+          <a:p>
+            <a:r>
+              <a:rPr lang="en-US" sz="1000" dirty="0"/>
+              <a:t>Regula/</a:t>
+            </a:r>
+            <a:br>
+              <a:rPr lang="en-US" sz="1000" dirty="0"/>
+            </a:br>
+            <a:r>
+              <a:rPr lang="en-US" sz="1000" dirty="0" err="1"/>
+              <a:t>CFRipper</a:t>
+            </a:r>
+            <a:endParaRPr lang="en-DE" sz="1000" dirty="0"/>
+          </a:p>
+        </p:txBody>
+      </p:sp>
+      <p:sp>
+        <p:nvSpPr>
+          <p:cNvPr id="19" name="TextBox 18">
+            <a:extLst>
+              <a:ext uri="{FF2B5EF4-FFF2-40B4-BE49-F238E27FC236}">
+                <a16:creationId xmlns:a16="http://schemas.microsoft.com/office/drawing/2014/main" id="{D2AFE067-5FAE-BB45-B297-CA9083D499C2}"/>
+              </a:ext>
+            </a:extLst>
+          </p:cNvPr>
+          <p:cNvSpPr txBox="1"/>
+          <p:nvPr/>
+        </p:nvSpPr>
+        <p:spPr>
+          <a:xfrm>
+            <a:off x="7886238" y="3308367"/>
+            <a:ext cx="880369" cy="246221"/>
+          </a:xfrm>
+          <a:prstGeom prst="rect">
+            <a:avLst/>
+          </a:prstGeom>
+        </p:spPr>
+        <p:style>
+          <a:lnRef idx="2">
+            <a:schemeClr val="accent1">
+              <a:shade val="50000"/>
+            </a:schemeClr>
+          </a:lnRef>
+          <a:fillRef idx="1">
+            <a:schemeClr val="accent1"/>
+          </a:fillRef>
+          <a:effectRef idx="0">
+            <a:schemeClr val="accent1"/>
+          </a:effectRef>
+          <a:fontRef idx="minor">
+            <a:schemeClr val="lt1"/>
+          </a:fontRef>
+        </p:style>
+        <p:txBody>
+          <a:bodyPr wrap="none" rtlCol="0">
+            <a:spAutoFit/>
+          </a:bodyPr>
+          <a:lstStyle/>
+          <a:p>
+            <a:r>
+              <a:rPr lang="en-US" sz="1000" dirty="0"/>
+              <a:t>AWS Config</a:t>
+            </a:r>
+            <a:endParaRPr lang="en-DE" sz="1000" dirty="0"/>
+          </a:p>
+        </p:txBody>
+      </p:sp>
+      <p:sp>
+        <p:nvSpPr>
+          <p:cNvPr id="21" name="TextBox 20">
+            <a:extLst>
+              <a:ext uri="{FF2B5EF4-FFF2-40B4-BE49-F238E27FC236}">
+                <a16:creationId xmlns:a16="http://schemas.microsoft.com/office/drawing/2014/main" id="{82502869-AE22-DF42-9A66-E8BFAF66BA6F}"/>
+              </a:ext>
+            </a:extLst>
+          </p:cNvPr>
+          <p:cNvSpPr txBox="1"/>
+          <p:nvPr/>
+        </p:nvSpPr>
+        <p:spPr>
+          <a:xfrm>
+            <a:off x="3965076" y="2235163"/>
+            <a:ext cx="1189749" cy="553998"/>
+          </a:xfrm>
+          <a:prstGeom prst="rect">
+            <a:avLst/>
+          </a:prstGeom>
+        </p:spPr>
+        <p:style>
+          <a:lnRef idx="2">
+            <a:schemeClr val="accent1">
+              <a:shade val="50000"/>
+            </a:schemeClr>
+          </a:lnRef>
+          <a:fillRef idx="1">
+            <a:schemeClr val="accent1"/>
+          </a:fillRef>
+          <a:effectRef idx="0">
+            <a:schemeClr val="accent1"/>
+          </a:effectRef>
+          <a:fontRef idx="minor">
+            <a:schemeClr val="lt1"/>
+          </a:fontRef>
+        </p:style>
+        <p:txBody>
+          <a:bodyPr wrap="none" rtlCol="0">
+            <a:spAutoFit/>
+          </a:bodyPr>
+          <a:lstStyle/>
+          <a:p>
+            <a:r>
+              <a:rPr lang="en-US" sz="1000" dirty="0"/>
+              <a:t>ECR Native </a:t>
+            </a:r>
+            <a:br>
+              <a:rPr lang="en-US" sz="1000" dirty="0"/>
+            </a:br>
+            <a:r>
+              <a:rPr lang="en-US" sz="1000" dirty="0"/>
+              <a:t>Image scanning / </a:t>
+            </a:r>
+            <a:br>
+              <a:rPr lang="en-US" sz="1000" dirty="0"/>
+            </a:br>
+            <a:r>
+              <a:rPr lang="en-US" sz="1000" dirty="0" err="1"/>
+              <a:t>Anchore</a:t>
+            </a:r>
+            <a:endParaRPr lang="en-DE" sz="1000" dirty="0"/>
+          </a:p>
+        </p:txBody>
+      </p:sp>
+      <p:sp>
+        <p:nvSpPr>
+          <p:cNvPr id="22" name="TextBox 21">
+            <a:extLst>
+              <a:ext uri="{FF2B5EF4-FFF2-40B4-BE49-F238E27FC236}">
+                <a16:creationId xmlns:a16="http://schemas.microsoft.com/office/drawing/2014/main" id="{74D565D0-47D4-4346-A9A3-6693679474AD}"/>
+              </a:ext>
+            </a:extLst>
+          </p:cNvPr>
+          <p:cNvSpPr txBox="1"/>
+          <p:nvPr/>
+        </p:nvSpPr>
+        <p:spPr>
+          <a:xfrm>
+            <a:off x="5829517" y="2267110"/>
+            <a:ext cx="989738" cy="246221"/>
+          </a:xfrm>
+          <a:prstGeom prst="rect">
+            <a:avLst/>
+          </a:prstGeom>
+        </p:spPr>
+        <p:style>
+          <a:lnRef idx="2">
+            <a:schemeClr val="accent1">
+              <a:shade val="50000"/>
+            </a:schemeClr>
+          </a:lnRef>
+          <a:fillRef idx="1">
+            <a:schemeClr val="accent1"/>
+          </a:fillRef>
+          <a:effectRef idx="0">
+            <a:schemeClr val="accent1"/>
+          </a:effectRef>
+          <a:fontRef idx="minor">
+            <a:schemeClr val="lt1"/>
+          </a:fontRef>
+        </p:style>
+        <p:txBody>
+          <a:bodyPr wrap="square" rtlCol="0">
+            <a:spAutoFit/>
+          </a:bodyPr>
+          <a:lstStyle/>
+          <a:p>
+            <a:r>
+              <a:rPr lang="en-US" sz="1000" dirty="0"/>
+              <a:t>terraform plan</a:t>
+            </a:r>
+            <a:endParaRPr lang="en-DE" sz="1000" dirty="0"/>
+          </a:p>
+        </p:txBody>
+      </p:sp>
+      <p:sp>
+        <p:nvSpPr>
+          <p:cNvPr id="23" name="TextBox 22">
+            <a:extLst>
+              <a:ext uri="{FF2B5EF4-FFF2-40B4-BE49-F238E27FC236}">
+                <a16:creationId xmlns:a16="http://schemas.microsoft.com/office/drawing/2014/main" id="{15EBE3AC-CAA1-844E-956E-C6B587A6E5BD}"/>
+              </a:ext>
+            </a:extLst>
+          </p:cNvPr>
+          <p:cNvSpPr txBox="1"/>
+          <p:nvPr/>
+        </p:nvSpPr>
+        <p:spPr>
+          <a:xfrm>
+            <a:off x="7688075" y="2331257"/>
+            <a:ext cx="1078532" cy="246221"/>
+          </a:xfrm>
+          <a:prstGeom prst="rect">
+            <a:avLst/>
+          </a:prstGeom>
+        </p:spPr>
+        <p:style>
+          <a:lnRef idx="2">
+            <a:schemeClr val="accent1">
+              <a:shade val="50000"/>
+            </a:schemeClr>
+          </a:lnRef>
+          <a:fillRef idx="1">
+            <a:schemeClr val="accent1"/>
+          </a:fillRef>
+          <a:effectRef idx="0">
+            <a:schemeClr val="accent1"/>
+          </a:effectRef>
+          <a:fontRef idx="minor">
+            <a:schemeClr val="lt1"/>
+          </a:fontRef>
+        </p:style>
+        <p:txBody>
+          <a:bodyPr wrap="square" rtlCol="0">
+            <a:spAutoFit/>
+          </a:bodyPr>
+          <a:lstStyle/>
+          <a:p>
+            <a:r>
+              <a:rPr lang="en-US" sz="1000" dirty="0"/>
+              <a:t>terraform apply</a:t>
+            </a:r>
+            <a:endParaRPr lang="en-DE" sz="1000" dirty="0"/>
           </a:p>
         </p:txBody>
       </p:sp>

</xml_diff>